<commit_message>
First working version of the Windows Subsystem for Linux support.
</commit_message>
<xml_diff>
--- a/resources/diagrams.pptx
+++ b/resources/diagrams.pptx
@@ -11,19 +11,20 @@
     <p:sldMasterId id="2147483741" r:id="rId7"/>
   </p:sldMasterIdLst>
   <p:notesMasterIdLst>
-    <p:notesMasterId r:id="rId13"/>
+    <p:notesMasterId r:id="rId14"/>
   </p:notesMasterIdLst>
   <p:sldIdLst>
     <p:sldId id="592" r:id="rId8"/>
     <p:sldId id="595" r:id="rId9"/>
     <p:sldId id="593" r:id="rId10"/>
     <p:sldId id="596" r:id="rId11"/>
-    <p:sldId id="594" r:id="rId12"/>
+    <p:sldId id="597" r:id="rId12"/>
+    <p:sldId id="594" r:id="rId13"/>
   </p:sldIdLst>
   <p:sldSz cx="12192000" cy="6858000"/>
   <p:notesSz cx="6858000" cy="9144000"/>
   <p:custDataLst>
-    <p:tags r:id="rId14"/>
+    <p:tags r:id="rId15"/>
   </p:custDataLst>
   <p:defaultTextStyle>
     <a:defPPr>
@@ -146,10 +147,6 @@
 </p:cmAuthorLst>
 </file>
 
-<file path=ppt/revisionInfo.xml><?xml version="1.0" encoding="utf-8"?>
-<p1510:revInfo xmlns:a="http://schemas.openxmlformats.org/drawingml/2006/main" xmlns:r="http://schemas.openxmlformats.org/officeDocument/2006/relationships" xmlns:p1510="http://schemas.microsoft.com/office/powerpoint/2015/10/main"/>
-</file>
-
 <file path=ppt/notesMasters/notesMaster1.xml><?xml version="1.0" encoding="utf-8"?>
 <p:notesMaster xmlns:a="http://schemas.openxmlformats.org/drawingml/2006/main" xmlns:r="http://schemas.openxmlformats.org/officeDocument/2006/relationships" xmlns:p="http://schemas.openxmlformats.org/presentationml/2006/main">
   <p:cSld>
@@ -233,7 +230,7 @@
             <a:fld id="{8C4CD305-C8EB-014F-809E-A167267EBAE0}" type="datetimeFigureOut">
               <a:rPr lang="en-US" smtClean="0"/>
               <a:pPr/>
-              <a:t>3/14/2018</a:t>
+              <a:t>9/11/2018</a:t>
             </a:fld>
             <a:endParaRPr lang="en-US"/>
           </a:p>
@@ -860,7 +857,7 @@
                 </a:solidFill>
               </a:rPr>
               <a:pPr/>
-              <a:t>5</a:t>
+              <a:t>6</a:t>
             </a:fld>
             <a:endParaRPr lang="en-US">
               <a:solidFill>
@@ -26419,6 +26416,1378 @@
 </file>
 
 <file path=ppt/slides/slide5.xml><?xml version="1.0" encoding="utf-8"?>
+<p:sld xmlns:a="http://schemas.openxmlformats.org/drawingml/2006/main" xmlns:r="http://schemas.openxmlformats.org/officeDocument/2006/relationships" xmlns:p="http://schemas.openxmlformats.org/presentationml/2006/main">
+  <p:cSld>
+    <p:spTree>
+      <p:nvGrpSpPr>
+        <p:cNvPr id="1" name=""/>
+        <p:cNvGrpSpPr/>
+        <p:nvPr/>
+      </p:nvGrpSpPr>
+      <p:grpSpPr>
+        <a:xfrm>
+          <a:off x="0" y="0"/>
+          <a:ext cx="0" cy="0"/>
+          <a:chOff x="0" y="0"/>
+          <a:chExt cx="0" cy="0"/>
+        </a:xfrm>
+      </p:grpSpPr>
+      <p:sp>
+        <p:nvSpPr>
+          <p:cNvPr id="67" name="Rectangle 66">
+            <a:extLst>
+              <a:ext uri="{FF2B5EF4-FFF2-40B4-BE49-F238E27FC236}">
+                <a16:creationId xmlns:a16="http://schemas.microsoft.com/office/drawing/2014/main" id="{B4483781-0628-45AC-ACB2-CF1EBF116E3E}"/>
+              </a:ext>
+            </a:extLst>
+          </p:cNvPr>
+          <p:cNvSpPr/>
+          <p:nvPr/>
+        </p:nvSpPr>
+        <p:spPr bwMode="auto">
+          <a:xfrm>
+            <a:off x="7134160" y="1615633"/>
+            <a:ext cx="4512847" cy="2023785"/>
+          </a:xfrm>
+          <a:prstGeom prst="rect">
+            <a:avLst/>
+          </a:prstGeom>
+          <a:solidFill>
+            <a:schemeClr val="accent1">
+              <a:lumMod val="20000"/>
+              <a:lumOff val="80000"/>
+            </a:schemeClr>
+          </a:solidFill>
+          <a:ln>
+            <a:headEnd type="none" w="med" len="med"/>
+            <a:tailEnd type="none" w="med" len="med"/>
+          </a:ln>
+        </p:spPr>
+        <p:style>
+          <a:lnRef idx="1">
+            <a:schemeClr val="accent1"/>
+          </a:lnRef>
+          <a:fillRef idx="2">
+            <a:schemeClr val="accent1"/>
+          </a:fillRef>
+          <a:effectRef idx="1">
+            <a:schemeClr val="accent1"/>
+          </a:effectRef>
+          <a:fontRef idx="minor">
+            <a:schemeClr val="dk1"/>
+          </a:fontRef>
+        </p:style>
+        <p:txBody>
+          <a:bodyPr vert="horz" wrap="square" lIns="91440" tIns="45720" rIns="91440" bIns="45720" numCol="1" rtlCol="0" anchor="t" anchorCtr="0" compatLnSpc="1">
+            <a:prstTxWarp prst="textNoShape">
+              <a:avLst/>
+            </a:prstTxWarp>
+            <a:noAutofit/>
+          </a:bodyPr>
+          <a:lstStyle/>
+          <a:p>
+            <a:pPr marL="342900" indent="-342900" algn="ctr" defTabSz="914400" fontAlgn="base">
+              <a:lnSpc>
+                <a:spcPct val="80000"/>
+              </a:lnSpc>
+              <a:spcBef>
+                <a:spcPct val="20000"/>
+              </a:spcBef>
+              <a:spcAft>
+                <a:spcPct val="0"/>
+              </a:spcAft>
+              <a:buClr>
+                <a:srgbClr val="5BBDF9"/>
+              </a:buClr>
+              <a:buSzPct val="60000"/>
+              <a:buFont typeface="Arial Narrow" pitchFamily="34" charset="0"/>
+              <a:buNone/>
+            </a:pPr>
+            <a:r>
+              <a:rPr lang="en-CA" sz="2000" b="1" dirty="0">
+                <a:solidFill>
+                  <a:srgbClr val="000000"/>
+                </a:solidFill>
+              </a:rPr>
+              <a:t>BOSH VM</a:t>
+            </a:r>
+          </a:p>
+        </p:txBody>
+      </p:sp>
+      <p:grpSp>
+        <p:nvGrpSpPr>
+          <p:cNvPr id="63" name="Group 62">
+            <a:extLst>
+              <a:ext uri="{FF2B5EF4-FFF2-40B4-BE49-F238E27FC236}">
+                <a16:creationId xmlns:a16="http://schemas.microsoft.com/office/drawing/2014/main" id="{CD1B6681-F714-4700-83B8-200BBF0BEED2}"/>
+              </a:ext>
+            </a:extLst>
+          </p:cNvPr>
+          <p:cNvGrpSpPr/>
+          <p:nvPr/>
+        </p:nvGrpSpPr>
+        <p:grpSpPr>
+          <a:xfrm>
+            <a:off x="2078071" y="2639452"/>
+            <a:ext cx="2882004" cy="1153195"/>
+            <a:chOff x="1413937" y="2651985"/>
+            <a:chExt cx="2513344" cy="982329"/>
+          </a:xfrm>
+        </p:grpSpPr>
+        <p:sp>
+          <p:nvSpPr>
+            <p:cNvPr id="64" name="Rectangle 63">
+              <a:extLst>
+                <a:ext uri="{FF2B5EF4-FFF2-40B4-BE49-F238E27FC236}">
+                  <a16:creationId xmlns:a16="http://schemas.microsoft.com/office/drawing/2014/main" id="{03F62B1A-D8B5-47B4-827F-1C0EE26F56F3}"/>
+                </a:ext>
+              </a:extLst>
+            </p:cNvPr>
+            <p:cNvSpPr/>
+            <p:nvPr/>
+          </p:nvSpPr>
+          <p:spPr bwMode="auto">
+            <a:xfrm>
+              <a:off x="1413937" y="2651985"/>
+              <a:ext cx="2513344" cy="982329"/>
+            </a:xfrm>
+            <a:prstGeom prst="rect">
+              <a:avLst/>
+            </a:prstGeom>
+            <a:ln>
+              <a:headEnd type="none" w="med" len="med"/>
+              <a:tailEnd type="none" w="med" len="med"/>
+            </a:ln>
+          </p:spPr>
+          <p:style>
+            <a:lnRef idx="1">
+              <a:schemeClr val="accent3"/>
+            </a:lnRef>
+            <a:fillRef idx="3">
+              <a:schemeClr val="accent3"/>
+            </a:fillRef>
+            <a:effectRef idx="2">
+              <a:schemeClr val="accent3"/>
+            </a:effectRef>
+            <a:fontRef idx="minor">
+              <a:schemeClr val="lt1"/>
+            </a:fontRef>
+          </p:style>
+          <p:txBody>
+            <a:bodyPr vert="horz" wrap="square" lIns="91440" tIns="45720" rIns="91440" bIns="45720" numCol="1" rtlCol="0" anchor="t" anchorCtr="0" compatLnSpc="1">
+              <a:prstTxWarp prst="textNoShape">
+                <a:avLst/>
+              </a:prstTxWarp>
+              <a:noAutofit/>
+            </a:bodyPr>
+            <a:lstStyle/>
+            <a:p>
+              <a:pPr marL="342900" marR="0" indent="-342900" algn="l" defTabSz="914400" rtl="0" eaLnBrk="1" fontAlgn="base" latinLnBrk="0" hangingPunct="1">
+                <a:lnSpc>
+                  <a:spcPct val="80000"/>
+                </a:lnSpc>
+                <a:spcBef>
+                  <a:spcPct val="20000"/>
+                </a:spcBef>
+                <a:spcAft>
+                  <a:spcPct val="0"/>
+                </a:spcAft>
+                <a:buClr>
+                  <a:schemeClr val="hlink"/>
+                </a:buClr>
+                <a:buSzPct val="60000"/>
+                <a:buFont typeface="Arial Narrow" pitchFamily="34" charset="0"/>
+                <a:buNone/>
+                <a:tabLst/>
+              </a:pPr>
+              <a:endParaRPr kumimoji="0" lang="en-CA" sz="2000" b="1" i="0" u="none" strike="noStrike" cap="none" normalizeH="0" baseline="0">
+                <a:ln>
+                  <a:noFill/>
+                </a:ln>
+                <a:solidFill>
+                  <a:schemeClr val="tx1"/>
+                </a:solidFill>
+                <a:effectLst/>
+                <a:latin typeface="Arial" charset="0"/>
+              </a:endParaRPr>
+            </a:p>
+          </p:txBody>
+        </p:sp>
+        <p:sp>
+          <p:nvSpPr>
+            <p:cNvPr id="65" name="TextBox 64">
+              <a:extLst>
+                <a:ext uri="{FF2B5EF4-FFF2-40B4-BE49-F238E27FC236}">
+                  <a16:creationId xmlns:a16="http://schemas.microsoft.com/office/drawing/2014/main" id="{363CCE8B-6F58-48B3-9E7C-9E4BCDA5DC18}"/>
+                </a:ext>
+              </a:extLst>
+            </p:cNvPr>
+            <p:cNvSpPr txBox="1"/>
+            <p:nvPr/>
+          </p:nvSpPr>
+          <p:spPr>
+            <a:xfrm>
+              <a:off x="1512453" y="2682689"/>
+              <a:ext cx="2263141" cy="307777"/>
+            </a:xfrm>
+            <a:prstGeom prst="rect">
+              <a:avLst/>
+            </a:prstGeom>
+            <a:noFill/>
+          </p:spPr>
+          <p:txBody>
+            <a:bodyPr wrap="square" rtlCol="0">
+              <a:spAutoFit/>
+            </a:bodyPr>
+            <a:lstStyle/>
+            <a:p>
+              <a:pPr algn="ctr"/>
+              <a:r>
+                <a:rPr lang="en-CA" sz="1400"/>
+                <a:t>solace-messaging-cf-dev</a:t>
+              </a:r>
+            </a:p>
+          </p:txBody>
+        </p:sp>
+        <p:pic>
+          <p:nvPicPr>
+            <p:cNvPr id="66" name="Picture 65">
+              <a:extLst>
+                <a:ext uri="{FF2B5EF4-FFF2-40B4-BE49-F238E27FC236}">
+                  <a16:creationId xmlns:a16="http://schemas.microsoft.com/office/drawing/2014/main" id="{990FE416-3C44-4A07-A03B-2E89B1C43C83}"/>
+                </a:ext>
+              </a:extLst>
+            </p:cNvPr>
+            <p:cNvPicPr>
+              <a:picLocks noChangeAspect="1"/>
+            </p:cNvPicPr>
+            <p:nvPr/>
+          </p:nvPicPr>
+          <p:blipFill>
+            <a:blip r:embed="rId2"/>
+            <a:stretch>
+              <a:fillRect/>
+            </a:stretch>
+          </p:blipFill>
+          <p:spPr>
+            <a:xfrm>
+              <a:off x="1812193" y="3333947"/>
+              <a:ext cx="753787" cy="286439"/>
+            </a:xfrm>
+            <a:prstGeom prst="rect">
+              <a:avLst/>
+            </a:prstGeom>
+          </p:spPr>
+        </p:pic>
+      </p:grpSp>
+      <p:cxnSp>
+        <p:nvCxnSpPr>
+          <p:cNvPr id="3" name="Straight Arrow Connector 2">
+            <a:extLst>
+              <a:ext uri="{FF2B5EF4-FFF2-40B4-BE49-F238E27FC236}">
+                <a16:creationId xmlns:a16="http://schemas.microsoft.com/office/drawing/2014/main" id="{8813ED74-4DA1-483B-9CDD-89C78E74F3DF}"/>
+              </a:ext>
+            </a:extLst>
+          </p:cNvPr>
+          <p:cNvCxnSpPr/>
+          <p:nvPr/>
+        </p:nvCxnSpPr>
+        <p:spPr bwMode="auto">
+          <a:xfrm>
+            <a:off x="5432287" y="3761712"/>
+            <a:ext cx="1827470" cy="517100"/>
+          </a:xfrm>
+          <a:prstGeom prst="straightConnector1">
+            <a:avLst/>
+          </a:prstGeom>
+          <a:ln>
+            <a:headEnd type="none" w="med" len="med"/>
+            <a:tailEnd type="triangle"/>
+          </a:ln>
+        </p:spPr>
+        <p:style>
+          <a:lnRef idx="3">
+            <a:schemeClr val="accent5"/>
+          </a:lnRef>
+          <a:fillRef idx="0">
+            <a:schemeClr val="accent5"/>
+          </a:fillRef>
+          <a:effectRef idx="2">
+            <a:schemeClr val="accent5"/>
+          </a:effectRef>
+          <a:fontRef idx="minor">
+            <a:schemeClr val="tx1"/>
+          </a:fontRef>
+        </p:style>
+      </p:cxnSp>
+      <p:sp>
+        <p:nvSpPr>
+          <p:cNvPr id="4" name="Rectangle 3">
+            <a:extLst>
+              <a:ext uri="{FF2B5EF4-FFF2-40B4-BE49-F238E27FC236}">
+                <a16:creationId xmlns:a16="http://schemas.microsoft.com/office/drawing/2014/main" id="{309979AD-EC0C-4512-9F80-933F1C1469D2}"/>
+              </a:ext>
+            </a:extLst>
+          </p:cNvPr>
+          <p:cNvSpPr/>
+          <p:nvPr/>
+        </p:nvSpPr>
+        <p:spPr bwMode="auto">
+          <a:xfrm>
+            <a:off x="7319180" y="4225742"/>
+            <a:ext cx="2126827" cy="1841039"/>
+          </a:xfrm>
+          <a:prstGeom prst="rect">
+            <a:avLst/>
+          </a:prstGeom>
+          <a:solidFill>
+            <a:schemeClr val="accent1">
+              <a:lumMod val="20000"/>
+              <a:lumOff val="80000"/>
+            </a:schemeClr>
+          </a:solidFill>
+          <a:ln>
+            <a:headEnd type="none" w="med" len="med"/>
+            <a:tailEnd type="none" w="med" len="med"/>
+          </a:ln>
+        </p:spPr>
+        <p:style>
+          <a:lnRef idx="1">
+            <a:schemeClr val="accent1"/>
+          </a:lnRef>
+          <a:fillRef idx="2">
+            <a:schemeClr val="accent1"/>
+          </a:fillRef>
+          <a:effectRef idx="1">
+            <a:schemeClr val="accent1"/>
+          </a:effectRef>
+          <a:fontRef idx="minor">
+            <a:schemeClr val="dk1"/>
+          </a:fontRef>
+        </p:style>
+        <p:txBody>
+          <a:bodyPr vert="horz" wrap="square" lIns="91440" tIns="45720" rIns="91440" bIns="45720" numCol="1" rtlCol="0" anchor="b" anchorCtr="0" compatLnSpc="1">
+            <a:prstTxWarp prst="textNoShape">
+              <a:avLst/>
+            </a:prstTxWarp>
+            <a:noAutofit/>
+          </a:bodyPr>
+          <a:lstStyle/>
+          <a:p>
+            <a:pPr marL="342900" indent="-342900" algn="ctr" defTabSz="914400" fontAlgn="base">
+              <a:lnSpc>
+                <a:spcPct val="80000"/>
+              </a:lnSpc>
+              <a:spcBef>
+                <a:spcPct val="20000"/>
+              </a:spcBef>
+              <a:spcAft>
+                <a:spcPct val="0"/>
+              </a:spcAft>
+              <a:buClr>
+                <a:srgbClr val="5BBDF9"/>
+              </a:buClr>
+              <a:buSzPct val="60000"/>
+              <a:buFont typeface="Arial Narrow" pitchFamily="34" charset="0"/>
+              <a:buNone/>
+            </a:pPr>
+            <a:endParaRPr lang="en-CA">
+              <a:solidFill>
+                <a:srgbClr val="000000"/>
+              </a:solidFill>
+            </a:endParaRPr>
+          </a:p>
+        </p:txBody>
+      </p:sp>
+      <p:grpSp>
+        <p:nvGrpSpPr>
+          <p:cNvPr id="36" name="Group 35">
+            <a:extLst>
+              <a:ext uri="{FF2B5EF4-FFF2-40B4-BE49-F238E27FC236}">
+                <a16:creationId xmlns:a16="http://schemas.microsoft.com/office/drawing/2014/main" id="{3C81B786-EB68-4EA6-9F7F-4C5C89250BC0}"/>
+              </a:ext>
+            </a:extLst>
+          </p:cNvPr>
+          <p:cNvGrpSpPr/>
+          <p:nvPr/>
+        </p:nvGrpSpPr>
+        <p:grpSpPr>
+          <a:xfrm>
+            <a:off x="5074835" y="3414299"/>
+            <a:ext cx="318324" cy="369332"/>
+            <a:chOff x="2790018" y="5072988"/>
+            <a:chExt cx="318324" cy="369332"/>
+          </a:xfrm>
+        </p:grpSpPr>
+        <p:sp>
+          <p:nvSpPr>
+            <p:cNvPr id="37" name="Oval 36">
+              <a:extLst>
+                <a:ext uri="{FF2B5EF4-FFF2-40B4-BE49-F238E27FC236}">
+                  <a16:creationId xmlns:a16="http://schemas.microsoft.com/office/drawing/2014/main" id="{6A3FD9BD-AC7C-4E82-A2E0-8F940698C0C8}"/>
+                </a:ext>
+              </a:extLst>
+            </p:cNvPr>
+            <p:cNvSpPr/>
+            <p:nvPr/>
+          </p:nvSpPr>
+          <p:spPr bwMode="auto">
+            <a:xfrm>
+              <a:off x="2790018" y="5116682"/>
+              <a:ext cx="318324" cy="316259"/>
+            </a:xfrm>
+            <a:prstGeom prst="ellipse">
+              <a:avLst/>
+            </a:prstGeom>
+            <a:solidFill>
+              <a:schemeClr val="accent5">
+                <a:lumMod val="60000"/>
+                <a:lumOff val="40000"/>
+              </a:schemeClr>
+            </a:solidFill>
+            <a:ln>
+              <a:headEnd type="none" w="med" len="med"/>
+              <a:tailEnd type="none" w="med" len="med"/>
+            </a:ln>
+          </p:spPr>
+          <p:style>
+            <a:lnRef idx="0">
+              <a:schemeClr val="accent2"/>
+            </a:lnRef>
+            <a:fillRef idx="3">
+              <a:schemeClr val="accent2"/>
+            </a:fillRef>
+            <a:effectRef idx="3">
+              <a:schemeClr val="accent2"/>
+            </a:effectRef>
+            <a:fontRef idx="minor">
+              <a:schemeClr val="lt1"/>
+            </a:fontRef>
+          </p:style>
+          <p:txBody>
+            <a:bodyPr vert="horz" wrap="square" lIns="91440" tIns="45720" rIns="91440" bIns="45720" numCol="1" rtlCol="0" anchor="t" anchorCtr="0" compatLnSpc="1">
+              <a:prstTxWarp prst="textNoShape">
+                <a:avLst/>
+              </a:prstTxWarp>
+              <a:noAutofit/>
+            </a:bodyPr>
+            <a:lstStyle/>
+            <a:p>
+              <a:pPr marL="342900" marR="0" indent="-342900" algn="l" defTabSz="914400" rtl="0" eaLnBrk="1" fontAlgn="base" latinLnBrk="0" hangingPunct="1">
+                <a:lnSpc>
+                  <a:spcPct val="80000"/>
+                </a:lnSpc>
+                <a:spcBef>
+                  <a:spcPct val="20000"/>
+                </a:spcBef>
+                <a:spcAft>
+                  <a:spcPct val="0"/>
+                </a:spcAft>
+                <a:buClr>
+                  <a:schemeClr val="hlink"/>
+                </a:buClr>
+                <a:buSzPct val="60000"/>
+                <a:buFont typeface="Arial Narrow" pitchFamily="34" charset="0"/>
+                <a:buNone/>
+                <a:tabLst/>
+              </a:pPr>
+              <a:endParaRPr kumimoji="0" lang="en-CA" sz="2000" b="1" i="0" u="none" strike="noStrike" cap="none" normalizeH="0" baseline="0">
+                <a:ln>
+                  <a:noFill/>
+                </a:ln>
+                <a:solidFill>
+                  <a:schemeClr val="accent4">
+                    <a:lumMod val="95000"/>
+                    <a:lumOff val="5000"/>
+                  </a:schemeClr>
+                </a:solidFill>
+                <a:effectLst/>
+                <a:latin typeface="Arial" charset="0"/>
+              </a:endParaRPr>
+            </a:p>
+          </p:txBody>
+        </p:sp>
+        <p:sp>
+          <p:nvSpPr>
+            <p:cNvPr id="38" name="TextBox 37">
+              <a:extLst>
+                <a:ext uri="{FF2B5EF4-FFF2-40B4-BE49-F238E27FC236}">
+                  <a16:creationId xmlns:a16="http://schemas.microsoft.com/office/drawing/2014/main" id="{DC315CDA-7F48-4B66-9FC3-0E0BB55A8155}"/>
+                </a:ext>
+              </a:extLst>
+            </p:cNvPr>
+            <p:cNvSpPr txBox="1"/>
+            <p:nvPr/>
+          </p:nvSpPr>
+          <p:spPr>
+            <a:xfrm flipH="1">
+              <a:off x="2792489" y="5072988"/>
+              <a:ext cx="315853" cy="369332"/>
+            </a:xfrm>
+            <a:prstGeom prst="rect">
+              <a:avLst/>
+            </a:prstGeom>
+            <a:noFill/>
+          </p:spPr>
+          <p:txBody>
+            <a:bodyPr wrap="square" rtlCol="0">
+              <a:spAutoFit/>
+            </a:bodyPr>
+            <a:lstStyle/>
+            <a:p>
+              <a:r>
+                <a:rPr lang="en-CA"/>
+                <a:t>1</a:t>
+              </a:r>
+            </a:p>
+          </p:txBody>
+        </p:sp>
+      </p:grpSp>
+      <p:grpSp>
+        <p:nvGrpSpPr>
+          <p:cNvPr id="39" name="Group 38">
+            <a:extLst>
+              <a:ext uri="{FF2B5EF4-FFF2-40B4-BE49-F238E27FC236}">
+                <a16:creationId xmlns:a16="http://schemas.microsoft.com/office/drawing/2014/main" id="{F21797EB-1E99-4893-A56D-2C6B6C0FF814}"/>
+              </a:ext>
+            </a:extLst>
+          </p:cNvPr>
+          <p:cNvGrpSpPr/>
+          <p:nvPr/>
+        </p:nvGrpSpPr>
+        <p:grpSpPr>
+          <a:xfrm>
+            <a:off x="5093717" y="2943991"/>
+            <a:ext cx="318324" cy="369332"/>
+            <a:chOff x="2790018" y="5072988"/>
+            <a:chExt cx="318324" cy="369332"/>
+          </a:xfrm>
+        </p:grpSpPr>
+        <p:sp>
+          <p:nvSpPr>
+            <p:cNvPr id="40" name="Oval 39">
+              <a:extLst>
+                <a:ext uri="{FF2B5EF4-FFF2-40B4-BE49-F238E27FC236}">
+                  <a16:creationId xmlns:a16="http://schemas.microsoft.com/office/drawing/2014/main" id="{F1712A0D-09AF-474B-8168-9E3CAE31A032}"/>
+                </a:ext>
+              </a:extLst>
+            </p:cNvPr>
+            <p:cNvSpPr/>
+            <p:nvPr/>
+          </p:nvSpPr>
+          <p:spPr bwMode="auto">
+            <a:xfrm>
+              <a:off x="2790018" y="5116682"/>
+              <a:ext cx="318324" cy="316259"/>
+            </a:xfrm>
+            <a:prstGeom prst="ellipse">
+              <a:avLst/>
+            </a:prstGeom>
+            <a:solidFill>
+              <a:schemeClr val="accent5">
+                <a:lumMod val="60000"/>
+                <a:lumOff val="40000"/>
+              </a:schemeClr>
+            </a:solidFill>
+            <a:ln>
+              <a:headEnd type="none" w="med" len="med"/>
+              <a:tailEnd type="none" w="med" len="med"/>
+            </a:ln>
+          </p:spPr>
+          <p:style>
+            <a:lnRef idx="0">
+              <a:schemeClr val="accent2"/>
+            </a:lnRef>
+            <a:fillRef idx="3">
+              <a:schemeClr val="accent2"/>
+            </a:fillRef>
+            <a:effectRef idx="3">
+              <a:schemeClr val="accent2"/>
+            </a:effectRef>
+            <a:fontRef idx="minor">
+              <a:schemeClr val="lt1"/>
+            </a:fontRef>
+          </p:style>
+          <p:txBody>
+            <a:bodyPr vert="horz" wrap="square" lIns="91440" tIns="45720" rIns="91440" bIns="45720" numCol="1" rtlCol="0" anchor="t" anchorCtr="0" compatLnSpc="1">
+              <a:prstTxWarp prst="textNoShape">
+                <a:avLst/>
+              </a:prstTxWarp>
+              <a:noAutofit/>
+            </a:bodyPr>
+            <a:lstStyle/>
+            <a:p>
+              <a:pPr marL="342900" marR="0" indent="-342900" algn="l" defTabSz="914400" rtl="0" eaLnBrk="1" fontAlgn="base" latinLnBrk="0" hangingPunct="1">
+                <a:lnSpc>
+                  <a:spcPct val="80000"/>
+                </a:lnSpc>
+                <a:spcBef>
+                  <a:spcPct val="20000"/>
+                </a:spcBef>
+                <a:spcAft>
+                  <a:spcPct val="0"/>
+                </a:spcAft>
+                <a:buClr>
+                  <a:schemeClr val="hlink"/>
+                </a:buClr>
+                <a:buSzPct val="60000"/>
+                <a:buFont typeface="Arial Narrow" pitchFamily="34" charset="0"/>
+                <a:buNone/>
+                <a:tabLst/>
+              </a:pPr>
+              <a:endParaRPr kumimoji="0" lang="en-CA" sz="2000" b="1" i="0" u="none" strike="noStrike" cap="none" normalizeH="0" baseline="0">
+                <a:ln>
+                  <a:noFill/>
+                </a:ln>
+                <a:solidFill>
+                  <a:schemeClr val="accent4">
+                    <a:lumMod val="95000"/>
+                    <a:lumOff val="5000"/>
+                  </a:schemeClr>
+                </a:solidFill>
+                <a:effectLst/>
+                <a:latin typeface="Arial" charset="0"/>
+              </a:endParaRPr>
+            </a:p>
+          </p:txBody>
+        </p:sp>
+        <p:sp>
+          <p:nvSpPr>
+            <p:cNvPr id="41" name="TextBox 40">
+              <a:extLst>
+                <a:ext uri="{FF2B5EF4-FFF2-40B4-BE49-F238E27FC236}">
+                  <a16:creationId xmlns:a16="http://schemas.microsoft.com/office/drawing/2014/main" id="{A968649F-1586-49DC-B2F1-A421D732FFF4}"/>
+                </a:ext>
+              </a:extLst>
+            </p:cNvPr>
+            <p:cNvSpPr txBox="1"/>
+            <p:nvPr/>
+          </p:nvSpPr>
+          <p:spPr>
+            <a:xfrm flipH="1">
+              <a:off x="2792489" y="5072988"/>
+              <a:ext cx="315853" cy="369332"/>
+            </a:xfrm>
+            <a:prstGeom prst="rect">
+              <a:avLst/>
+            </a:prstGeom>
+            <a:noFill/>
+          </p:spPr>
+          <p:txBody>
+            <a:bodyPr wrap="square" rtlCol="0">
+              <a:spAutoFit/>
+            </a:bodyPr>
+            <a:lstStyle/>
+            <a:p>
+              <a:r>
+                <a:rPr lang="en-CA" dirty="0"/>
+                <a:t>2</a:t>
+              </a:r>
+            </a:p>
+          </p:txBody>
+        </p:sp>
+      </p:grpSp>
+      <p:pic>
+        <p:nvPicPr>
+          <p:cNvPr id="51" name="Picture 50">
+            <a:extLst>
+              <a:ext uri="{FF2B5EF4-FFF2-40B4-BE49-F238E27FC236}">
+                <a16:creationId xmlns:a16="http://schemas.microsoft.com/office/drawing/2014/main" id="{A097568C-9C3B-4CA9-ABB9-124B4001D7BE}"/>
+              </a:ext>
+            </a:extLst>
+          </p:cNvPr>
+          <p:cNvPicPr>
+            <a:picLocks noChangeAspect="1"/>
+          </p:cNvPicPr>
+          <p:nvPr/>
+        </p:nvPicPr>
+        <p:blipFill>
+          <a:blip r:embed="rId3"/>
+          <a:stretch>
+            <a:fillRect/>
+          </a:stretch>
+        </p:blipFill>
+        <p:spPr>
+          <a:xfrm>
+            <a:off x="7357074" y="5627381"/>
+            <a:ext cx="354135" cy="381080"/>
+          </a:xfrm>
+          <a:prstGeom prst="rect">
+            <a:avLst/>
+          </a:prstGeom>
+        </p:spPr>
+      </p:pic>
+      <p:sp>
+        <p:nvSpPr>
+          <p:cNvPr id="52" name="TextBox 51">
+            <a:extLst>
+              <a:ext uri="{FF2B5EF4-FFF2-40B4-BE49-F238E27FC236}">
+                <a16:creationId xmlns:a16="http://schemas.microsoft.com/office/drawing/2014/main" id="{F5204333-1804-43DF-A40C-91B8250B95D2}"/>
+              </a:ext>
+            </a:extLst>
+          </p:cNvPr>
+          <p:cNvSpPr txBox="1"/>
+          <p:nvPr/>
+        </p:nvSpPr>
+        <p:spPr>
+          <a:xfrm>
+            <a:off x="7662379" y="5664032"/>
+            <a:ext cx="583814" cy="307777"/>
+          </a:xfrm>
+          <a:prstGeom prst="rect">
+            <a:avLst/>
+          </a:prstGeom>
+          <a:noFill/>
+        </p:spPr>
+        <p:txBody>
+          <a:bodyPr wrap="none" rtlCol="0">
+            <a:spAutoFit/>
+          </a:bodyPr>
+          <a:lstStyle/>
+          <a:p>
+            <a:r>
+              <a:rPr lang="en-CA" sz="1400" b="1" dirty="0">
+                <a:solidFill>
+                  <a:srgbClr val="000000"/>
+                </a:solidFill>
+              </a:rPr>
+              <a:t>WSL</a:t>
+            </a:r>
+          </a:p>
+        </p:txBody>
+      </p:sp>
+      <p:sp>
+        <p:nvSpPr>
+          <p:cNvPr id="54" name="Rectangle 53">
+            <a:extLst>
+              <a:ext uri="{FF2B5EF4-FFF2-40B4-BE49-F238E27FC236}">
+                <a16:creationId xmlns:a16="http://schemas.microsoft.com/office/drawing/2014/main" id="{6035A5FB-803E-424B-BF4D-77A9D8983B4C}"/>
+              </a:ext>
+            </a:extLst>
+          </p:cNvPr>
+          <p:cNvSpPr/>
+          <p:nvPr/>
+        </p:nvSpPr>
+        <p:spPr bwMode="auto">
+          <a:xfrm>
+            <a:off x="3377781" y="3418257"/>
+            <a:ext cx="1132623" cy="398421"/>
+          </a:xfrm>
+          <a:prstGeom prst="rect">
+            <a:avLst/>
+          </a:prstGeom>
+          <a:noFill/>
+          <a:ln w="9525" cap="flat" cmpd="sng" algn="ctr">
+            <a:noFill/>
+            <a:prstDash val="solid"/>
+            <a:round/>
+            <a:headEnd type="none" w="med" len="med"/>
+            <a:tailEnd type="none" w="med" len="med"/>
+          </a:ln>
+          <a:effectLst/>
+        </p:spPr>
+        <p:txBody>
+          <a:bodyPr vert="horz" wrap="square" lIns="91440" tIns="45720" rIns="91440" bIns="45720" numCol="1" rtlCol="0" anchor="t" anchorCtr="0" compatLnSpc="1">
+            <a:prstTxWarp prst="textNoShape">
+              <a:avLst/>
+            </a:prstTxWarp>
+            <a:spAutoFit/>
+          </a:bodyPr>
+          <a:lstStyle/>
+          <a:p>
+            <a:pPr marL="342900" marR="0" indent="-342900" algn="l" defTabSz="914400" rtl="0" eaLnBrk="1" fontAlgn="base" latinLnBrk="0" hangingPunct="1">
+              <a:lnSpc>
+                <a:spcPct val="80000"/>
+              </a:lnSpc>
+              <a:spcBef>
+                <a:spcPct val="20000"/>
+              </a:spcBef>
+              <a:spcAft>
+                <a:spcPct val="0"/>
+              </a:spcAft>
+              <a:buClr>
+                <a:schemeClr val="hlink"/>
+              </a:buClr>
+              <a:buSzPct val="60000"/>
+              <a:buFont typeface="Arial Narrow" pitchFamily="34" charset="0"/>
+              <a:buNone/>
+              <a:tabLst/>
+            </a:pPr>
+            <a:endParaRPr kumimoji="0" lang="en-US" sz="2000" b="1" i="0" u="none" strike="noStrike" cap="none" normalizeH="0" baseline="0">
+              <a:ln>
+                <a:noFill/>
+              </a:ln>
+              <a:solidFill>
+                <a:schemeClr val="tx1"/>
+              </a:solidFill>
+              <a:effectLst/>
+              <a:latin typeface="Arial" charset="0"/>
+            </a:endParaRPr>
+          </a:p>
+        </p:txBody>
+      </p:sp>
+      <p:sp>
+        <p:nvSpPr>
+          <p:cNvPr id="55" name="Rectangle 54">
+            <a:extLst>
+              <a:ext uri="{FF2B5EF4-FFF2-40B4-BE49-F238E27FC236}">
+                <a16:creationId xmlns:a16="http://schemas.microsoft.com/office/drawing/2014/main" id="{A50695D7-6FD5-4CF6-AD3C-1BC5149D5DBB}"/>
+              </a:ext>
+            </a:extLst>
+          </p:cNvPr>
+          <p:cNvSpPr/>
+          <p:nvPr/>
+        </p:nvSpPr>
+        <p:spPr bwMode="auto">
+          <a:xfrm>
+            <a:off x="2255138" y="2994215"/>
+            <a:ext cx="2528033" cy="424732"/>
+          </a:xfrm>
+          <a:prstGeom prst="rect">
+            <a:avLst/>
+          </a:prstGeom>
+          <a:ln>
+            <a:headEnd type="none" w="med" len="med"/>
+            <a:tailEnd type="none" w="med" len="med"/>
+          </a:ln>
+        </p:spPr>
+        <p:style>
+          <a:lnRef idx="2">
+            <a:schemeClr val="accent5"/>
+          </a:lnRef>
+          <a:fillRef idx="1">
+            <a:schemeClr val="lt1"/>
+          </a:fillRef>
+          <a:effectRef idx="0">
+            <a:schemeClr val="accent5"/>
+          </a:effectRef>
+          <a:fontRef idx="minor">
+            <a:schemeClr val="dk1"/>
+          </a:fontRef>
+        </p:style>
+        <p:txBody>
+          <a:bodyPr vert="horz" wrap="square" lIns="91440" tIns="45720" rIns="91440" bIns="45720" numCol="1" rtlCol="0" anchor="t" anchorCtr="0" compatLnSpc="1">
+            <a:prstTxWarp prst="textNoShape">
+              <a:avLst/>
+            </a:prstTxWarp>
+            <a:spAutoFit/>
+          </a:bodyPr>
+          <a:lstStyle/>
+          <a:p>
+            <a:pPr marL="342900" marR="0" indent="-342900" algn="ctr" defTabSz="914400" rtl="0" eaLnBrk="1" fontAlgn="base" latinLnBrk="0" hangingPunct="1">
+              <a:lnSpc>
+                <a:spcPct val="80000"/>
+              </a:lnSpc>
+              <a:spcBef>
+                <a:spcPct val="20000"/>
+              </a:spcBef>
+              <a:spcAft>
+                <a:spcPct val="0"/>
+              </a:spcAft>
+              <a:buClr>
+                <a:schemeClr val="hlink"/>
+              </a:buClr>
+              <a:buSzPct val="60000"/>
+              <a:buFont typeface="Arial Narrow" pitchFamily="34" charset="0"/>
+              <a:buNone/>
+              <a:tabLst/>
+            </a:pPr>
+            <a:r>
+              <a:rPr kumimoji="0" lang="en-US" sz="1200" b="1" i="0" u="none" strike="noStrike" cap="none" normalizeH="0" baseline="0">
+                <a:ln>
+                  <a:noFill/>
+                </a:ln>
+                <a:solidFill>
+                  <a:schemeClr val="tx1"/>
+                </a:solidFill>
+                <a:effectLst/>
+                <a:latin typeface="Arial" charset="0"/>
+              </a:rPr>
+              <a:t>cf-solace-messaging</a:t>
+            </a:r>
+          </a:p>
+          <a:p>
+            <a:pPr marL="342900" marR="0" indent="-342900" algn="ctr" defTabSz="914400" rtl="0" eaLnBrk="1" fontAlgn="base" latinLnBrk="0" hangingPunct="1">
+              <a:lnSpc>
+                <a:spcPct val="80000"/>
+              </a:lnSpc>
+              <a:spcBef>
+                <a:spcPct val="20000"/>
+              </a:spcBef>
+              <a:spcAft>
+                <a:spcPct val="0"/>
+              </a:spcAft>
+              <a:buClr>
+                <a:schemeClr val="hlink"/>
+              </a:buClr>
+              <a:buSzPct val="60000"/>
+              <a:buFont typeface="Arial Narrow" pitchFamily="34" charset="0"/>
+              <a:buNone/>
+              <a:tabLst/>
+            </a:pPr>
+            <a:r>
+              <a:rPr kumimoji="0" lang="en-US" sz="1200" b="1" i="0" u="none" strike="noStrike" cap="none" normalizeH="0" baseline="0">
+                <a:ln>
+                  <a:noFill/>
+                </a:ln>
+                <a:solidFill>
+                  <a:schemeClr val="tx1"/>
+                </a:solidFill>
+                <a:effectLst/>
+                <a:latin typeface="Arial" charset="0"/>
+              </a:rPr>
+              <a:t>deployment</a:t>
+            </a:r>
+            <a:r>
+              <a:rPr lang="en-US" sz="1200" b="1">
+                <a:solidFill>
+                  <a:schemeClr val="tx1"/>
+                </a:solidFill>
+                <a:latin typeface="Arial" charset="0"/>
+              </a:rPr>
+              <a:t> (submodule)</a:t>
+            </a:r>
+          </a:p>
+        </p:txBody>
+      </p:sp>
+      <p:cxnSp>
+        <p:nvCxnSpPr>
+          <p:cNvPr id="56" name="Straight Arrow Connector 55">
+            <a:extLst>
+              <a:ext uri="{FF2B5EF4-FFF2-40B4-BE49-F238E27FC236}">
+                <a16:creationId xmlns:a16="http://schemas.microsoft.com/office/drawing/2014/main" id="{22A88802-C558-42E8-B6A2-2C36F7A28495}"/>
+              </a:ext>
+            </a:extLst>
+          </p:cNvPr>
+          <p:cNvCxnSpPr>
+            <a:cxnSpLocks/>
+          </p:cNvCxnSpPr>
+          <p:nvPr/>
+        </p:nvCxnSpPr>
+        <p:spPr bwMode="auto">
+          <a:xfrm flipV="1">
+            <a:off x="5506650" y="3096288"/>
+            <a:ext cx="2703202" cy="77263"/>
+          </a:xfrm>
+          <a:prstGeom prst="straightConnector1">
+            <a:avLst/>
+          </a:prstGeom>
+          <a:ln>
+            <a:headEnd type="none" w="med" len="med"/>
+            <a:tailEnd type="triangle"/>
+          </a:ln>
+        </p:spPr>
+        <p:style>
+          <a:lnRef idx="3">
+            <a:schemeClr val="accent5"/>
+          </a:lnRef>
+          <a:fillRef idx="0">
+            <a:schemeClr val="accent5"/>
+          </a:fillRef>
+          <a:effectRef idx="2">
+            <a:schemeClr val="accent5"/>
+          </a:effectRef>
+          <a:fontRef idx="minor">
+            <a:schemeClr val="tx1"/>
+          </a:fontRef>
+        </p:style>
+      </p:cxnSp>
+      <p:sp>
+        <p:nvSpPr>
+          <p:cNvPr id="57" name="Rectangle 56">
+            <a:extLst>
+              <a:ext uri="{FF2B5EF4-FFF2-40B4-BE49-F238E27FC236}">
+                <a16:creationId xmlns:a16="http://schemas.microsoft.com/office/drawing/2014/main" id="{C0247565-C00F-4427-8F15-E309C5FAD322}"/>
+              </a:ext>
+            </a:extLst>
+          </p:cNvPr>
+          <p:cNvSpPr/>
+          <p:nvPr/>
+        </p:nvSpPr>
+        <p:spPr bwMode="auto">
+          <a:xfrm>
+            <a:off x="8280508" y="2012731"/>
+            <a:ext cx="1412296" cy="1436204"/>
+          </a:xfrm>
+          <a:prstGeom prst="rect">
+            <a:avLst/>
+          </a:prstGeom>
+          <a:noFill/>
+          <a:ln>
+            <a:headEnd type="none" w="med" len="med"/>
+            <a:tailEnd type="none" w="med" len="med"/>
+          </a:ln>
+        </p:spPr>
+        <p:style>
+          <a:lnRef idx="2">
+            <a:schemeClr val="dk1"/>
+          </a:lnRef>
+          <a:fillRef idx="1">
+            <a:schemeClr val="lt1"/>
+          </a:fillRef>
+          <a:effectRef idx="0">
+            <a:schemeClr val="dk1"/>
+          </a:effectRef>
+          <a:fontRef idx="minor">
+            <a:schemeClr val="dk1"/>
+          </a:fontRef>
+        </p:style>
+        <p:txBody>
+          <a:bodyPr vert="horz" wrap="square" lIns="91440" tIns="45720" rIns="91440" bIns="45720" numCol="1" rtlCol="0" anchor="t" anchorCtr="0" compatLnSpc="1">
+            <a:prstTxWarp prst="textNoShape">
+              <a:avLst/>
+            </a:prstTxWarp>
+            <a:spAutoFit/>
+          </a:bodyPr>
+          <a:lstStyle/>
+          <a:p>
+            <a:pPr marL="342900" marR="0" indent="-342900" algn="l" defTabSz="914400" rtl="0" eaLnBrk="1" fontAlgn="base" latinLnBrk="0" hangingPunct="1">
+              <a:lnSpc>
+                <a:spcPct val="80000"/>
+              </a:lnSpc>
+              <a:spcBef>
+                <a:spcPct val="20000"/>
+              </a:spcBef>
+              <a:spcAft>
+                <a:spcPct val="0"/>
+              </a:spcAft>
+              <a:buClr>
+                <a:schemeClr val="hlink"/>
+              </a:buClr>
+              <a:buSzPct val="60000"/>
+              <a:buFont typeface="Arial Narrow" pitchFamily="34" charset="0"/>
+              <a:buNone/>
+              <a:tabLst/>
+            </a:pPr>
+            <a:endParaRPr kumimoji="0" lang="en-US" sz="2000" b="1" i="0" u="none" strike="noStrike" cap="none" normalizeH="0" baseline="0">
+              <a:ln>
+                <a:noFill/>
+              </a:ln>
+              <a:solidFill>
+                <a:schemeClr val="tx1"/>
+              </a:solidFill>
+              <a:effectLst/>
+              <a:latin typeface="Arial" charset="0"/>
+            </a:endParaRPr>
+          </a:p>
+        </p:txBody>
+      </p:sp>
+      <p:sp>
+        <p:nvSpPr>
+          <p:cNvPr id="58" name="TextBox 57">
+            <a:extLst>
+              <a:ext uri="{FF2B5EF4-FFF2-40B4-BE49-F238E27FC236}">
+                <a16:creationId xmlns:a16="http://schemas.microsoft.com/office/drawing/2014/main" id="{210B1777-4E1A-4D84-8BBD-9E88F557E5E4}"/>
+              </a:ext>
+            </a:extLst>
+          </p:cNvPr>
+          <p:cNvSpPr txBox="1"/>
+          <p:nvPr/>
+        </p:nvSpPr>
+        <p:spPr>
+          <a:xfrm>
+            <a:off x="8278901" y="1969030"/>
+            <a:ext cx="1925015" cy="369332"/>
+          </a:xfrm>
+          <a:prstGeom prst="rect">
+            <a:avLst/>
+          </a:prstGeom>
+          <a:noFill/>
+        </p:spPr>
+        <p:txBody>
+          <a:bodyPr wrap="square" rtlCol="0">
+            <a:spAutoFit/>
+          </a:bodyPr>
+          <a:lstStyle/>
+          <a:p>
+            <a:r>
+              <a:rPr lang="en-US" sz="1400"/>
+              <a:t>CF</a:t>
+            </a:r>
+            <a:r>
+              <a:rPr lang="en-US"/>
+              <a:t> </a:t>
+            </a:r>
+            <a:r>
+              <a:rPr lang="en-US" sz="1400"/>
+              <a:t>Deployment</a:t>
+            </a:r>
+          </a:p>
+        </p:txBody>
+      </p:sp>
+      <p:sp>
+        <p:nvSpPr>
+          <p:cNvPr id="59" name="Rectangle 58">
+            <a:extLst>
+              <a:ext uri="{FF2B5EF4-FFF2-40B4-BE49-F238E27FC236}">
+                <a16:creationId xmlns:a16="http://schemas.microsoft.com/office/drawing/2014/main" id="{3B3F741D-7036-4CCC-9AA6-CF888822C4D7}"/>
+              </a:ext>
+            </a:extLst>
+          </p:cNvPr>
+          <p:cNvSpPr/>
+          <p:nvPr/>
+        </p:nvSpPr>
+        <p:spPr bwMode="auto">
+          <a:xfrm>
+            <a:off x="7289600" y="2488778"/>
+            <a:ext cx="856393" cy="264688"/>
+          </a:xfrm>
+          <a:prstGeom prst="rect">
+            <a:avLst/>
+          </a:prstGeom>
+          <a:solidFill>
+            <a:schemeClr val="bg1"/>
+          </a:solidFill>
+          <a:ln>
+            <a:solidFill>
+              <a:schemeClr val="accent1">
+                <a:lumMod val="60000"/>
+                <a:lumOff val="40000"/>
+              </a:schemeClr>
+            </a:solidFill>
+            <a:headEnd type="none" w="med" len="med"/>
+            <a:tailEnd type="none" w="med" len="med"/>
+          </a:ln>
+        </p:spPr>
+        <p:style>
+          <a:lnRef idx="2">
+            <a:schemeClr val="accent4"/>
+          </a:lnRef>
+          <a:fillRef idx="1">
+            <a:schemeClr val="lt1"/>
+          </a:fillRef>
+          <a:effectRef idx="0">
+            <a:schemeClr val="accent4"/>
+          </a:effectRef>
+          <a:fontRef idx="minor">
+            <a:schemeClr val="dk1"/>
+          </a:fontRef>
+        </p:style>
+        <p:txBody>
+          <a:bodyPr vert="horz" wrap="square" lIns="91440" tIns="45720" rIns="91440" bIns="45720" numCol="1" rtlCol="0" anchor="t" anchorCtr="0" compatLnSpc="1">
+            <a:prstTxWarp prst="textNoShape">
+              <a:avLst/>
+            </a:prstTxWarp>
+            <a:spAutoFit/>
+          </a:bodyPr>
+          <a:lstStyle/>
+          <a:p>
+            <a:pPr marL="342900" marR="0" indent="-342900" algn="l" defTabSz="914400" rtl="0" eaLnBrk="1" fontAlgn="base" latinLnBrk="0" hangingPunct="1">
+              <a:lnSpc>
+                <a:spcPct val="80000"/>
+              </a:lnSpc>
+              <a:spcBef>
+                <a:spcPct val="20000"/>
+              </a:spcBef>
+              <a:spcAft>
+                <a:spcPct val="0"/>
+              </a:spcAft>
+              <a:buClr>
+                <a:schemeClr val="hlink"/>
+              </a:buClr>
+              <a:buSzPct val="60000"/>
+              <a:buFont typeface="Arial Narrow" pitchFamily="34" charset="0"/>
+              <a:buNone/>
+              <a:tabLst/>
+            </a:pPr>
+            <a:r>
+              <a:rPr kumimoji="0" lang="en-US" sz="1300" b="1" i="0" u="none" strike="noStrike" cap="none" normalizeH="0" baseline="0">
+                <a:ln>
+                  <a:noFill/>
+                </a:ln>
+                <a:solidFill>
+                  <a:schemeClr val="tx1"/>
+                </a:solidFill>
+                <a:effectLst/>
+                <a:latin typeface="Arial" charset="0"/>
+              </a:rPr>
+              <a:t>p-</a:t>
+            </a:r>
+            <a:r>
+              <a:rPr kumimoji="0" lang="en-US" sz="1300" b="1" i="0" u="none" strike="noStrike" cap="none" normalizeH="0" baseline="0" err="1">
+                <a:ln>
+                  <a:noFill/>
+                </a:ln>
+                <a:solidFill>
+                  <a:schemeClr val="tx1"/>
+                </a:solidFill>
+                <a:effectLst/>
+                <a:latin typeface="Arial" charset="0"/>
+              </a:rPr>
+              <a:t>mysql</a:t>
+            </a:r>
+            <a:r>
+              <a:rPr kumimoji="0" lang="en-US" sz="1400" b="1" i="0" u="none" strike="noStrike" cap="none" normalizeH="0" baseline="0">
+                <a:ln>
+                  <a:noFill/>
+                </a:ln>
+                <a:solidFill>
+                  <a:schemeClr val="tx1"/>
+                </a:solidFill>
+                <a:effectLst/>
+                <a:latin typeface="Arial" charset="0"/>
+              </a:rPr>
+              <a:t> </a:t>
+            </a:r>
+          </a:p>
+        </p:txBody>
+      </p:sp>
+      <p:cxnSp>
+        <p:nvCxnSpPr>
+          <p:cNvPr id="60" name="Straight Arrow Connector 59">
+            <a:extLst>
+              <a:ext uri="{FF2B5EF4-FFF2-40B4-BE49-F238E27FC236}">
+                <a16:creationId xmlns:a16="http://schemas.microsoft.com/office/drawing/2014/main" id="{255D9C90-7218-431C-B310-43ED35408785}"/>
+              </a:ext>
+            </a:extLst>
+          </p:cNvPr>
+          <p:cNvCxnSpPr>
+            <a:cxnSpLocks/>
+          </p:cNvCxnSpPr>
+          <p:nvPr/>
+        </p:nvCxnSpPr>
+        <p:spPr bwMode="auto">
+          <a:xfrm flipV="1">
+            <a:off x="5479650" y="2730833"/>
+            <a:ext cx="1752277" cy="300165"/>
+          </a:xfrm>
+          <a:prstGeom prst="straightConnector1">
+            <a:avLst/>
+          </a:prstGeom>
+          <a:ln>
+            <a:headEnd type="none" w="med" len="med"/>
+            <a:tailEnd type="triangle"/>
+          </a:ln>
+        </p:spPr>
+        <p:style>
+          <a:lnRef idx="3">
+            <a:schemeClr val="accent5"/>
+          </a:lnRef>
+          <a:fillRef idx="0">
+            <a:schemeClr val="accent5"/>
+          </a:fillRef>
+          <a:effectRef idx="2">
+            <a:schemeClr val="accent5"/>
+          </a:effectRef>
+          <a:fontRef idx="minor">
+            <a:schemeClr val="tx1"/>
+          </a:fontRef>
+        </p:style>
+      </p:cxnSp>
+      <p:cxnSp>
+        <p:nvCxnSpPr>
+          <p:cNvPr id="61" name="Straight Arrow Connector 60">
+            <a:extLst>
+              <a:ext uri="{FF2B5EF4-FFF2-40B4-BE49-F238E27FC236}">
+                <a16:creationId xmlns:a16="http://schemas.microsoft.com/office/drawing/2014/main" id="{B85B0896-47CC-43A4-B4A1-465CC5E802D9}"/>
+              </a:ext>
+            </a:extLst>
+          </p:cNvPr>
+          <p:cNvCxnSpPr/>
+          <p:nvPr/>
+        </p:nvCxnSpPr>
+        <p:spPr bwMode="auto">
+          <a:xfrm flipV="1">
+            <a:off x="1222851" y="3418257"/>
+            <a:ext cx="816063" cy="429606"/>
+          </a:xfrm>
+          <a:prstGeom prst="straightConnector1">
+            <a:avLst/>
+          </a:prstGeom>
+          <a:ln>
+            <a:headEnd type="none" w="med" len="med"/>
+            <a:tailEnd type="triangle"/>
+          </a:ln>
+        </p:spPr>
+        <p:style>
+          <a:lnRef idx="3">
+            <a:schemeClr val="accent5"/>
+          </a:lnRef>
+          <a:fillRef idx="0">
+            <a:schemeClr val="accent5"/>
+          </a:fillRef>
+          <a:effectRef idx="2">
+            <a:schemeClr val="accent5"/>
+          </a:effectRef>
+          <a:fontRef idx="minor">
+            <a:schemeClr val="tx1"/>
+          </a:fontRef>
+        </p:style>
+      </p:cxnSp>
+      <p:pic>
+        <p:nvPicPr>
+          <p:cNvPr id="62" name="Picture 61">
+            <a:extLst>
+              <a:ext uri="{FF2B5EF4-FFF2-40B4-BE49-F238E27FC236}">
+                <a16:creationId xmlns:a16="http://schemas.microsoft.com/office/drawing/2014/main" id="{001D2C3D-DE16-47A3-97BB-B7B0742E9804}"/>
+              </a:ext>
+            </a:extLst>
+          </p:cNvPr>
+          <p:cNvPicPr>
+            <a:picLocks noChangeAspect="1"/>
+          </p:cNvPicPr>
+          <p:nvPr/>
+        </p:nvPicPr>
+        <p:blipFill>
+          <a:blip r:embed="rId3"/>
+          <a:stretch>
+            <a:fillRect/>
+          </a:stretch>
+        </p:blipFill>
+        <p:spPr>
+          <a:xfrm>
+            <a:off x="2143068" y="3415257"/>
+            <a:ext cx="354135" cy="381080"/>
+          </a:xfrm>
+          <a:prstGeom prst="rect">
+            <a:avLst/>
+          </a:prstGeom>
+        </p:spPr>
+      </p:pic>
+      <p:pic>
+        <p:nvPicPr>
+          <p:cNvPr id="68" name="Picture 67">
+            <a:extLst>
+              <a:ext uri="{FF2B5EF4-FFF2-40B4-BE49-F238E27FC236}">
+                <a16:creationId xmlns:a16="http://schemas.microsoft.com/office/drawing/2014/main" id="{005B1B56-1DEC-465C-983C-353EF8C5C839}"/>
+              </a:ext>
+            </a:extLst>
+          </p:cNvPr>
+          <p:cNvPicPr>
+            <a:picLocks noChangeAspect="1"/>
+          </p:cNvPicPr>
+          <p:nvPr/>
+        </p:nvPicPr>
+        <p:blipFill>
+          <a:blip r:embed="rId4"/>
+          <a:stretch>
+            <a:fillRect/>
+          </a:stretch>
+        </p:blipFill>
+        <p:spPr>
+          <a:xfrm>
+            <a:off x="322698" y="3273741"/>
+            <a:ext cx="983480" cy="1446293"/>
+          </a:xfrm>
+          <a:prstGeom prst="rect">
+            <a:avLst/>
+          </a:prstGeom>
+        </p:spPr>
+      </p:pic>
+    </p:spTree>
+    <p:extLst>
+      <p:ext uri="{BB962C8B-B14F-4D97-AF65-F5344CB8AC3E}">
+        <p14:creationId xmlns:p14="http://schemas.microsoft.com/office/powerpoint/2010/main" val="4208568157"/>
+      </p:ext>
+    </p:extLst>
+  </p:cSld>
+  <p:clrMapOvr>
+    <a:masterClrMapping/>
+  </p:clrMapOvr>
+</p:sld>
+</file>
+
+<file path=ppt/slides/slide6.xml><?xml version="1.0" encoding="utf-8"?>
 <p:sld xmlns:a="http://schemas.openxmlformats.org/drawingml/2006/main" xmlns:r="http://schemas.openxmlformats.org/officeDocument/2006/relationships" xmlns:p="http://schemas.openxmlformats.org/presentationml/2006/main">
   <p:cSld>
     <p:spTree>

</xml_diff>

<commit_message>
Updated the diagrams in the README.
</commit_message>
<xml_diff>
--- a/resources/diagrams.pptx
+++ b/resources/diagrams.pptx
@@ -24492,13 +24492,14 @@
           <p:cNvCxnSpPr>
             <a:cxnSpLocks/>
             <a:stCxn id="136" idx="0"/>
+            <a:endCxn id="61" idx="4"/>
           </p:cNvCxnSpPr>
           <p:nvPr/>
         </p:nvCxnSpPr>
         <p:spPr bwMode="auto">
           <a:xfrm flipV="1">
-            <a:off x="8693542" y="3057783"/>
-            <a:ext cx="227240" cy="724478"/>
+            <a:off x="8693542" y="2808778"/>
+            <a:ext cx="360278" cy="973483"/>
           </a:xfrm>
           <a:prstGeom prst="straightConnector1">
             <a:avLst/>
@@ -27281,6 +27282,49 @@
           </p:spPr>
         </p:pic>
       </p:grpSp>
+      <p:cxnSp>
+        <p:nvCxnSpPr>
+          <p:cNvPr id="106" name="Straight Arrow Connector 105">
+            <a:extLst>
+              <a:ext uri="{FF2B5EF4-FFF2-40B4-BE49-F238E27FC236}">
+                <a16:creationId xmlns:a16="http://schemas.microsoft.com/office/drawing/2014/main" id="{E08D65A2-29A8-4E41-A60F-B12C44E6B57B}"/>
+              </a:ext>
+            </a:extLst>
+          </p:cNvPr>
+          <p:cNvCxnSpPr>
+            <a:cxnSpLocks/>
+            <a:stCxn id="84" idx="0"/>
+          </p:cNvCxnSpPr>
+          <p:nvPr/>
+        </p:nvCxnSpPr>
+        <p:spPr bwMode="auto">
+          <a:xfrm flipV="1">
+            <a:off x="7755969" y="3036810"/>
+            <a:ext cx="676896" cy="829298"/>
+          </a:xfrm>
+          <a:prstGeom prst="straightConnector1">
+            <a:avLst/>
+          </a:prstGeom>
+          <a:ln>
+            <a:headEnd type="none" w="med" len="med"/>
+            <a:tailEnd type="triangle"/>
+          </a:ln>
+        </p:spPr>
+        <p:style>
+          <a:lnRef idx="3">
+            <a:schemeClr val="accent5"/>
+          </a:lnRef>
+          <a:fillRef idx="0">
+            <a:schemeClr val="accent5"/>
+          </a:fillRef>
+          <a:effectRef idx="2">
+            <a:schemeClr val="accent5"/>
+          </a:effectRef>
+          <a:fontRef idx="minor">
+            <a:schemeClr val="tx1"/>
+          </a:fontRef>
+        </p:style>
+      </p:cxnSp>
     </p:spTree>
     <p:extLst>
       <p:ext uri="{BB962C8B-B14F-4D97-AF65-F5344CB8AC3E}">

</xml_diff>